<commit_message>
Removed Old Snakify Link
</commit_message>
<xml_diff>
--- a/2021-11 Quick Intro to Coding in the Classroom/Quick Intro in Coding_Programming in the Classroom.pptx
+++ b/2021-11 Quick Intro to Coding in the Classroom/Quick Intro in Coding_Programming in the Classroom.pptx
@@ -8828,7 +8828,7 @@
                 </a:solidFill>
                 <a:hlinkClick r:id="rId4"/>
               </a:rPr>
-              <a:t>http://snakify.org.testednet.com/</a:t>
+              <a:t>https://groklearning.com/hoc/activity/animal-classifier/</a:t>
             </a:r>
             <a:endParaRPr/>
           </a:p>
@@ -8850,7 +8850,7 @@
                 </a:solidFill>
                 <a:hlinkClick r:id="rId5"/>
               </a:rPr>
-              <a:t>https://groklearning.com/hoc/activity/animal-classifier/</a:t>
+              <a:t>https://developers.google.com/edu/python</a:t>
             </a:r>
             <a:endParaRPr/>
           </a:p>
@@ -8872,7 +8872,11 @@
                 </a:solidFill>
                 <a:hlinkClick r:id="rId6"/>
               </a:rPr>
-              <a:t>https://developers.google.com/edu/python</a:t>
+              <a:t>https://www.py4e.com/</a:t>
+            </a:r>
+            <a:r>
+              <a:rPr lang="en"/>
+              <a:t> </a:t>
             </a:r>
             <a:endParaRPr/>
           </a:p>
@@ -8893,32 +8897,6 @@
                   <a:schemeClr val="hlink"/>
                 </a:solidFill>
                 <a:hlinkClick r:id="rId7"/>
-              </a:rPr>
-              <a:t>https://www.py4e.com/</a:t>
-            </a:r>
-            <a:r>
-              <a:rPr lang="en"/>
-              <a:t> </a:t>
-            </a:r>
-            <a:endParaRPr/>
-          </a:p>
-          <a:p>
-            <a:pPr indent="-342900" lvl="0" marL="457200" rtl="0" algn="l">
-              <a:spcBef>
-                <a:spcPts val="0"/>
-              </a:spcBef>
-              <a:spcAft>
-                <a:spcPts val="0"/>
-              </a:spcAft>
-              <a:buSzPts val="1800"/>
-              <a:buChar char="●"/>
-            </a:pPr>
-            <a:r>
-              <a:rPr lang="en" u="sng">
-                <a:solidFill>
-                  <a:schemeClr val="hlink"/>
-                </a:solidFill>
-                <a:hlinkClick r:id="rId8"/>
               </a:rPr>
               <a:t>https://www.codecademy.com/learn/learn-python-3/</a:t>
             </a:r>

</xml_diff>